<commit_message>
Before testing on remote server
</commit_message>
<xml_diff>
--- a/figures/psdtw-intuition.pptx
+++ b/figures/psdtw-intuition.pptx
@@ -261,7 +261,7 @@
           <a:p>
             <a:fld id="{3856C8F1-7A7E-ED4D-B118-346949A716F4}" type="datetimeFigureOut">
               <a:rPr lang="en-US" smtClean="0"/>
-              <a:t>6/2/25</a:t>
+              <a:t>12/9/25</a:t>
             </a:fld>
             <a:endParaRPr lang="en-US"/>
           </a:p>
@@ -461,7 +461,7 @@
           <a:p>
             <a:fld id="{3856C8F1-7A7E-ED4D-B118-346949A716F4}" type="datetimeFigureOut">
               <a:rPr lang="en-US" smtClean="0"/>
-              <a:t>6/2/25</a:t>
+              <a:t>12/9/25</a:t>
             </a:fld>
             <a:endParaRPr lang="en-US"/>
           </a:p>
@@ -671,7 +671,7 @@
           <a:p>
             <a:fld id="{3856C8F1-7A7E-ED4D-B118-346949A716F4}" type="datetimeFigureOut">
               <a:rPr lang="en-US" smtClean="0"/>
-              <a:t>6/2/25</a:t>
+              <a:t>12/9/25</a:t>
             </a:fld>
             <a:endParaRPr lang="en-US"/>
           </a:p>
@@ -871,7 +871,7 @@
           <a:p>
             <a:fld id="{3856C8F1-7A7E-ED4D-B118-346949A716F4}" type="datetimeFigureOut">
               <a:rPr lang="en-US" smtClean="0"/>
-              <a:t>6/2/25</a:t>
+              <a:t>12/9/25</a:t>
             </a:fld>
             <a:endParaRPr lang="en-US"/>
           </a:p>
@@ -1147,7 +1147,7 @@
           <a:p>
             <a:fld id="{3856C8F1-7A7E-ED4D-B118-346949A716F4}" type="datetimeFigureOut">
               <a:rPr lang="en-US" smtClean="0"/>
-              <a:t>6/2/25</a:t>
+              <a:t>12/9/25</a:t>
             </a:fld>
             <a:endParaRPr lang="en-US"/>
           </a:p>
@@ -1415,7 +1415,7 @@
           <a:p>
             <a:fld id="{3856C8F1-7A7E-ED4D-B118-346949A716F4}" type="datetimeFigureOut">
               <a:rPr lang="en-US" smtClean="0"/>
-              <a:t>6/2/25</a:t>
+              <a:t>12/9/25</a:t>
             </a:fld>
             <a:endParaRPr lang="en-US"/>
           </a:p>
@@ -1830,7 +1830,7 @@
           <a:p>
             <a:fld id="{3856C8F1-7A7E-ED4D-B118-346949A716F4}" type="datetimeFigureOut">
               <a:rPr lang="en-US" smtClean="0"/>
-              <a:t>6/2/25</a:t>
+              <a:t>12/9/25</a:t>
             </a:fld>
             <a:endParaRPr lang="en-US"/>
           </a:p>
@@ -1972,7 +1972,7 @@
           <a:p>
             <a:fld id="{3856C8F1-7A7E-ED4D-B118-346949A716F4}" type="datetimeFigureOut">
               <a:rPr lang="en-US" smtClean="0"/>
-              <a:t>6/2/25</a:t>
+              <a:t>12/9/25</a:t>
             </a:fld>
             <a:endParaRPr lang="en-US"/>
           </a:p>
@@ -2085,7 +2085,7 @@
           <a:p>
             <a:fld id="{3856C8F1-7A7E-ED4D-B118-346949A716F4}" type="datetimeFigureOut">
               <a:rPr lang="en-US" smtClean="0"/>
-              <a:t>6/2/25</a:t>
+              <a:t>12/9/25</a:t>
             </a:fld>
             <a:endParaRPr lang="en-US"/>
           </a:p>
@@ -2398,7 +2398,7 @@
           <a:p>
             <a:fld id="{3856C8F1-7A7E-ED4D-B118-346949A716F4}" type="datetimeFigureOut">
               <a:rPr lang="en-US" smtClean="0"/>
-              <a:t>6/2/25</a:t>
+              <a:t>12/9/25</a:t>
             </a:fld>
             <a:endParaRPr lang="en-US"/>
           </a:p>
@@ -2687,7 +2687,7 @@
           <a:p>
             <a:fld id="{3856C8F1-7A7E-ED4D-B118-346949A716F4}" type="datetimeFigureOut">
               <a:rPr lang="en-US" smtClean="0"/>
-              <a:t>6/2/25</a:t>
+              <a:t>12/9/25</a:t>
             </a:fld>
             <a:endParaRPr lang="en-US"/>
           </a:p>
@@ -2930,7 +2930,7 @@
           <a:p>
             <a:fld id="{3856C8F1-7A7E-ED4D-B118-346949A716F4}" type="datetimeFigureOut">
               <a:rPr lang="en-US" smtClean="0"/>
-              <a:t>6/2/25</a:t>
+              <a:t>12/9/25</a:t>
             </a:fld>
             <a:endParaRPr lang="en-US"/>
           </a:p>
@@ -4736,7 +4736,7 @@
                           <a:latin typeface="Cambria Math" panose="02040503050406030204" pitchFamily="18" charset="0"/>
                           <a:cs typeface="Times New Roman" panose="02020603050405020304" pitchFamily="18" charset="0"/>
                         </a:rPr>
-                        <m:t>(0:</m:t>
+                        <m:t>(1:</m:t>
                       </m:r>
                       <m:sSub>
                         <m:sSubPr>
@@ -4913,6 +4913,13 @@
                           <a:latin typeface="Cambria Math" panose="02040503050406030204" pitchFamily="18" charset="0"/>
                           <a:cs typeface="Times New Roman" panose="02020603050405020304" pitchFamily="18" charset="0"/>
                         </a:rPr>
+                        <m:t>+1</m:t>
+                      </m:r>
+                      <m:r>
+                        <a:rPr lang="en-US" sz="1600" b="0" i="1" smtClean="0">
+                          <a:latin typeface="Cambria Math" panose="02040503050406030204" pitchFamily="18" charset="0"/>
+                          <a:cs typeface="Times New Roman" panose="02020603050405020304" pitchFamily="18" charset="0"/>
+                        </a:rPr>
                         <m:t>:</m:t>
                       </m:r>
                       <m:sSub>
@@ -5022,7 +5029,7 @@
             </p:nvSpPr>
             <p:spPr>
               <a:xfrm>
-                <a:off x="5922524" y="2936655"/>
+                <a:off x="5953346" y="2936655"/>
                 <a:ext cx="1330757" cy="338554"/>
               </a:xfrm>
               <a:prstGeom prst="rect">
@@ -5085,6 +5092,13 @@
                           </m:r>
                         </m:sub>
                       </m:sSub>
+                      <m:r>
+                        <a:rPr lang="en-US" sz="1600" b="0" i="1" smtClean="0">
+                          <a:latin typeface="Cambria Math" panose="02040503050406030204" pitchFamily="18" charset="0"/>
+                          <a:cs typeface="Times New Roman" panose="02020603050405020304" pitchFamily="18" charset="0"/>
+                        </a:rPr>
+                        <m:t>+1</m:t>
+                      </m:r>
                       <m:r>
                         <a:rPr lang="en-US" sz="1600" b="0" i="1" smtClean="0">
                           <a:latin typeface="Cambria Math" panose="02040503050406030204" pitchFamily="18" charset="0"/>
@@ -5155,7 +5169,7 @@
             </p:nvSpPr>
             <p:spPr>
               <a:xfrm>
-                <a:off x="5922524" y="2936655"/>
+                <a:off x="5953346" y="2936655"/>
                 <a:ext cx="1330757" cy="338554"/>
               </a:xfrm>
               <a:prstGeom prst="rect">
@@ -5199,7 +5213,7 @@
             </p:nvSpPr>
             <p:spPr>
               <a:xfrm>
-                <a:off x="7207212" y="2938257"/>
+                <a:off x="7217486" y="2938257"/>
                 <a:ext cx="1485973" cy="338554"/>
               </a:xfrm>
               <a:prstGeom prst="rect">
@@ -5267,6 +5281,13 @@
                           <a:latin typeface="Cambria Math" panose="02040503050406030204" pitchFamily="18" charset="0"/>
                           <a:cs typeface="Times New Roman" panose="02020603050405020304" pitchFamily="18" charset="0"/>
                         </a:rPr>
+                        <m:t>+1</m:t>
+                      </m:r>
+                      <m:r>
+                        <a:rPr lang="en-US" sz="1600" b="0" i="1" smtClean="0">
+                          <a:latin typeface="Cambria Math" panose="02040503050406030204" pitchFamily="18" charset="0"/>
+                          <a:cs typeface="Times New Roman" panose="02020603050405020304" pitchFamily="18" charset="0"/>
+                        </a:rPr>
                         <m:t>:</m:t>
                       </m:r>
                       <m:r>
@@ -5311,7 +5332,7 @@
             </p:nvSpPr>
             <p:spPr>
               <a:xfrm>
-                <a:off x="7207212" y="2938257"/>
+                <a:off x="7217486" y="2938257"/>
                 <a:ext cx="1485973" cy="338554"/>
               </a:xfrm>
               <a:prstGeom prst="rect">
@@ -5588,7 +5609,7 @@
                           <a:latin typeface="Cambria Math" panose="02040503050406030204" pitchFamily="18" charset="0"/>
                           <a:cs typeface="Times New Roman" panose="02020603050405020304" pitchFamily="18" charset="0"/>
                         </a:rPr>
-                        <m:t>(0:</m:t>
+                        <m:t>(1:</m:t>
                       </m:r>
                       <m:sSub>
                         <m:sSubPr>
@@ -5697,7 +5718,7 @@
             </p:nvSpPr>
             <p:spPr>
               <a:xfrm>
-                <a:off x="4478378" y="3517967"/>
+                <a:off x="4462194" y="3517967"/>
                 <a:ext cx="1260000" cy="338554"/>
               </a:xfrm>
               <a:prstGeom prst="rect">
@@ -5760,6 +5781,13 @@
                           </m:r>
                         </m:sub>
                       </m:sSub>
+                      <m:r>
+                        <a:rPr lang="en-US" sz="1600" b="0" i="1" smtClean="0">
+                          <a:latin typeface="Cambria Math" panose="02040503050406030204" pitchFamily="18" charset="0"/>
+                          <a:cs typeface="Times New Roman" panose="02020603050405020304" pitchFamily="18" charset="0"/>
+                        </a:rPr>
+                        <m:t>+1</m:t>
+                      </m:r>
                       <m:r>
                         <a:rPr lang="en-US" sz="1600" b="0" i="1" smtClean="0">
                           <a:latin typeface="Cambria Math" panose="02040503050406030204" pitchFamily="18" charset="0"/>
@@ -5830,7 +5858,7 @@
             </p:nvSpPr>
             <p:spPr>
               <a:xfrm>
-                <a:off x="4478378" y="3517967"/>
+                <a:off x="4462194" y="3517967"/>
                 <a:ext cx="1260000" cy="338554"/>
               </a:xfrm>
               <a:prstGeom prst="rect">
@@ -5874,7 +5902,7 @@
             </p:nvSpPr>
             <p:spPr>
               <a:xfrm>
-                <a:off x="5750767" y="3518794"/>
+                <a:off x="5718399" y="3518794"/>
                 <a:ext cx="1330757" cy="338554"/>
               </a:xfrm>
               <a:prstGeom prst="rect">
@@ -5942,6 +5970,13 @@
                           <a:latin typeface="Cambria Math" panose="02040503050406030204" pitchFamily="18" charset="0"/>
                           <a:cs typeface="Times New Roman" panose="02020603050405020304" pitchFamily="18" charset="0"/>
                         </a:rPr>
+                        <m:t>+1</m:t>
+                      </m:r>
+                      <m:r>
+                        <a:rPr lang="en-US" sz="1600" b="0" i="1" smtClean="0">
+                          <a:latin typeface="Cambria Math" panose="02040503050406030204" pitchFamily="18" charset="0"/>
+                          <a:cs typeface="Times New Roman" panose="02020603050405020304" pitchFamily="18" charset="0"/>
+                        </a:rPr>
                         <m:t>:</m:t>
                       </m:r>
                       <m:r>
@@ -5986,7 +6021,7 @@
             </p:nvSpPr>
             <p:spPr>
               <a:xfrm>
-                <a:off x="5750767" y="3518794"/>
+                <a:off x="5718399" y="3518794"/>
                 <a:ext cx="1330757" cy="338554"/>
               </a:xfrm>
               <a:prstGeom prst="rect">
@@ -6073,7 +6108,7 @@
                               <a:latin typeface="Cambria Math" panose="02040503050406030204" pitchFamily="18" charset="0"/>
                               <a:cs typeface="Times New Roman" panose="02020603050405020304" pitchFamily="18" charset="0"/>
                             </a:rPr>
-                            <m:t>0</m:t>
+                            <m:t>1</m:t>
                           </m:r>
                           <m:r>
                             <a:rPr lang="en-US" sz="1600" b="0" i="1" smtClean="0">
@@ -6210,7 +6245,7 @@
                           <a:latin typeface="Cambria Math" panose="02040503050406030204" pitchFamily="18" charset="0"/>
                           <a:cs typeface="Times New Roman" panose="02020603050405020304" pitchFamily="18" charset="0"/>
                         </a:rPr>
-                        <m:t>:</m:t>
+                        <m:t>+1:</m:t>
                       </m:r>
                       <m:r>
                         <a:rPr lang="en-US" sz="1600" b="0" i="1" smtClean="0">

</xml_diff>